<commit_message>
oop/uml: intermediate concepts, tweak text
</commit_message>
<xml_diff>
--- a/diagrams/uml/classDiagrams/associationsAsAttributes/board.pptx
+++ b/diagrams/uml/classDiagrams/associationsAsAttributes/board.pptx
@@ -104,6 +104,22 @@
       </a:defRPr>
     </a:lvl9pPr>
   </p:defaultTextStyle>
+  <p:extLst>
+    <p:ext uri="{EFAFB233-063F-42B5-8137-9DF3F51BA10A}">
+      <p15:sldGuideLst xmlns:p15="http://schemas.microsoft.com/office/powerpoint/2012/main">
+        <p15:guide id="1" orient="horz" pos="2160">
+          <p15:clr>
+            <a:srgbClr val="A4A3A4"/>
+          </p15:clr>
+        </p15:guide>
+        <p15:guide id="2" pos="2880">
+          <p15:clr>
+            <a:srgbClr val="A4A3A4"/>
+          </p15:clr>
+        </p15:guide>
+      </p15:sldGuideLst>
+    </p:ext>
+  </p:extLst>
 </p:presentation>
 </file>
 
@@ -288,7 +304,7 @@
           <a:p>
             <a:fld id="{A0F86979-30DA-49EE-A740-32EBA6D2B7DE}" type="datetimeFigureOut">
               <a:rPr lang="en-SG" smtClean="0"/>
-              <a:t>2/6/2017</a:t>
+              <a:t>6/9/2017</a:t>
             </a:fld>
             <a:endParaRPr lang="en-SG"/>
           </a:p>
@@ -458,7 +474,7 @@
           <a:p>
             <a:fld id="{A0F86979-30DA-49EE-A740-32EBA6D2B7DE}" type="datetimeFigureOut">
               <a:rPr lang="en-SG" smtClean="0"/>
-              <a:t>2/6/2017</a:t>
+              <a:t>6/9/2017</a:t>
             </a:fld>
             <a:endParaRPr lang="en-SG"/>
           </a:p>
@@ -638,7 +654,7 @@
           <a:p>
             <a:fld id="{A0F86979-30DA-49EE-A740-32EBA6D2B7DE}" type="datetimeFigureOut">
               <a:rPr lang="en-SG" smtClean="0"/>
-              <a:t>2/6/2017</a:t>
+              <a:t>6/9/2017</a:t>
             </a:fld>
             <a:endParaRPr lang="en-SG"/>
           </a:p>
@@ -808,7 +824,7 @@
           <a:p>
             <a:fld id="{A0F86979-30DA-49EE-A740-32EBA6D2B7DE}" type="datetimeFigureOut">
               <a:rPr lang="en-SG" smtClean="0"/>
-              <a:t>2/6/2017</a:t>
+              <a:t>6/9/2017</a:t>
             </a:fld>
             <a:endParaRPr lang="en-SG"/>
           </a:p>
@@ -1054,7 +1070,7 @@
           <a:p>
             <a:fld id="{A0F86979-30DA-49EE-A740-32EBA6D2B7DE}" type="datetimeFigureOut">
               <a:rPr lang="en-SG" smtClean="0"/>
-              <a:t>2/6/2017</a:t>
+              <a:t>6/9/2017</a:t>
             </a:fld>
             <a:endParaRPr lang="en-SG"/>
           </a:p>
@@ -1342,7 +1358,7 @@
           <a:p>
             <a:fld id="{A0F86979-30DA-49EE-A740-32EBA6D2B7DE}" type="datetimeFigureOut">
               <a:rPr lang="en-SG" smtClean="0"/>
-              <a:t>2/6/2017</a:t>
+              <a:t>6/9/2017</a:t>
             </a:fld>
             <a:endParaRPr lang="en-SG"/>
           </a:p>
@@ -1764,7 +1780,7 @@
           <a:p>
             <a:fld id="{A0F86979-30DA-49EE-A740-32EBA6D2B7DE}" type="datetimeFigureOut">
               <a:rPr lang="en-SG" smtClean="0"/>
-              <a:t>2/6/2017</a:t>
+              <a:t>6/9/2017</a:t>
             </a:fld>
             <a:endParaRPr lang="en-SG"/>
           </a:p>
@@ -1882,7 +1898,7 @@
           <a:p>
             <a:fld id="{A0F86979-30DA-49EE-A740-32EBA6D2B7DE}" type="datetimeFigureOut">
               <a:rPr lang="en-SG" smtClean="0"/>
-              <a:t>2/6/2017</a:t>
+              <a:t>6/9/2017</a:t>
             </a:fld>
             <a:endParaRPr lang="en-SG"/>
           </a:p>
@@ -1977,7 +1993,7 @@
           <a:p>
             <a:fld id="{A0F86979-30DA-49EE-A740-32EBA6D2B7DE}" type="datetimeFigureOut">
               <a:rPr lang="en-SG" smtClean="0"/>
-              <a:t>2/6/2017</a:t>
+              <a:t>6/9/2017</a:t>
             </a:fld>
             <a:endParaRPr lang="en-SG"/>
           </a:p>
@@ -2254,7 +2270,7 @@
           <a:p>
             <a:fld id="{A0F86979-30DA-49EE-A740-32EBA6D2B7DE}" type="datetimeFigureOut">
               <a:rPr lang="en-SG" smtClean="0"/>
-              <a:t>2/6/2017</a:t>
+              <a:t>6/9/2017</a:t>
             </a:fld>
             <a:endParaRPr lang="en-SG"/>
           </a:p>
@@ -2507,7 +2523,7 @@
           <a:p>
             <a:fld id="{A0F86979-30DA-49EE-A740-32EBA6D2B7DE}" type="datetimeFigureOut">
               <a:rPr lang="en-SG" smtClean="0"/>
-              <a:t>2/6/2017</a:t>
+              <a:t>6/9/2017</a:t>
             </a:fld>
             <a:endParaRPr lang="en-SG"/>
           </a:p>
@@ -2720,7 +2736,7 @@
           <a:p>
             <a:fld id="{A0F86979-30DA-49EE-A740-32EBA6D2B7DE}" type="datetimeFigureOut">
               <a:rPr lang="en-SG" smtClean="0"/>
-              <a:t>2/6/2017</a:t>
+              <a:t>6/9/2017</a:t>
             </a:fld>
             <a:endParaRPr lang="en-SG"/>
           </a:p>
@@ -3103,7 +3119,7 @@
         </p:nvSpPr>
         <p:spPr>
           <a:xfrm>
-            <a:off x="3196633" y="2564904"/>
+            <a:off x="4860032" y="2302541"/>
             <a:ext cx="2743200" cy="369332"/>
           </a:xfrm>
           <a:prstGeom prst="rect">
@@ -3207,7 +3223,7 @@
         </p:nvSpPr>
         <p:spPr>
           <a:xfrm>
-            <a:off x="3196633" y="2881372"/>
+            <a:off x="4860032" y="2619009"/>
             <a:ext cx="2743200" cy="369332"/>
           </a:xfrm>
           <a:prstGeom prst="rect">
@@ -3274,21 +3290,57 @@
               <a:defRPr/>
             </a:pPr>
             <a:r>
-              <a:rPr kumimoji="0" lang="en-US" sz="1800" b="1" i="0" u="none" strike="noStrike" kern="0" cap="none" spc="0" normalizeH="0" baseline="0" noProof="0" dirty="0" smtClean="0">
+              <a:rPr kumimoji="0" lang="en-US" sz="1800" i="0" u="none" strike="noStrike" kern="0" cap="none" spc="0" normalizeH="0" baseline="0" noProof="0" dirty="0" smtClean="0">
                 <a:ln>
                   <a:noFill/>
                 </a:ln>
+                <a:solidFill>
+                  <a:srgbClr val="FF0000"/>
+                </a:solidFill>
                 <a:effectLst/>
                 <a:uLnTx/>
                 <a:uFillTx/>
                 <a:latin typeface="Calibri" pitchFamily="34" charset="0"/>
               </a:rPr>
-              <a:t>squares: Square[100]=null</a:t>
-            </a:r>
-            <a:endParaRPr kumimoji="0" lang="en-US" sz="1800" b="1" i="0" u="none" strike="noStrike" kern="0" cap="none" spc="0" normalizeH="0" baseline="0" noProof="0" dirty="0">
+              <a:t>squares</a:t>
+            </a:r>
+            <a:r>
+              <a:rPr kumimoji="0" lang="en-US" sz="1800" i="0" u="none" strike="noStrike" kern="0" cap="none" spc="0" normalizeH="0" baseline="0" noProof="0" smtClean="0">
+                <a:ln>
+                  <a:noFill/>
+                </a:ln>
+                <a:solidFill>
+                  <a:srgbClr val="FF0000"/>
+                </a:solidFill>
+                <a:effectLst/>
+                <a:uLnTx/>
+                <a:uFillTx/>
+                <a:latin typeface="Calibri" pitchFamily="34" charset="0"/>
+              </a:rPr>
+              <a:t>: </a:t>
+            </a:r>
+            <a:r>
+              <a:rPr kumimoji="0" lang="en-US" sz="1800" i="0" u="none" strike="noStrike" kern="0" cap="none" spc="0" normalizeH="0" baseline="0" noProof="0" smtClean="0">
+                <a:ln>
+                  <a:noFill/>
+                </a:ln>
+                <a:solidFill>
+                  <a:srgbClr val="FF0000"/>
+                </a:solidFill>
+                <a:effectLst/>
+                <a:uLnTx/>
+                <a:uFillTx/>
+                <a:latin typeface="Calibri" pitchFamily="34" charset="0"/>
+              </a:rPr>
+              <a:t>Square[100]</a:t>
+            </a:r>
+            <a:endParaRPr kumimoji="0" lang="en-US" sz="1800" i="0" u="none" strike="noStrike" kern="0" cap="none" spc="0" normalizeH="0" baseline="0" noProof="0" dirty="0">
               <a:ln>
                 <a:noFill/>
               </a:ln>
+              <a:solidFill>
+                <a:srgbClr val="FF0000"/>
+              </a:solidFill>
               <a:effectLst/>
               <a:uLnTx/>
               <a:uFillTx/>
@@ -3305,7 +3357,7 @@
         </p:nvSpPr>
         <p:spPr>
           <a:xfrm>
-            <a:off x="3196633" y="3250704"/>
+            <a:off x="4860032" y="2988341"/>
             <a:ext cx="2743200" cy="184666"/>
           </a:xfrm>
           <a:prstGeom prst="rect">
@@ -3375,6 +3427,946 @@
               <a:ln>
                 <a:noFill/>
               </a:ln>
+              <a:effectLst/>
+              <a:uLnTx/>
+              <a:uFillTx/>
+              <a:latin typeface="Calibri" pitchFamily="34" charset="0"/>
+            </a:endParaRPr>
+          </a:p>
+        </p:txBody>
+      </p:sp>
+      <p:sp>
+        <p:nvSpPr>
+          <p:cNvPr id="5" name="Rectangle 4"/>
+          <p:cNvSpPr/>
+          <p:nvPr/>
+        </p:nvSpPr>
+        <p:spPr>
+          <a:xfrm>
+            <a:off x="107504" y="2380238"/>
+            <a:ext cx="1143000" cy="369332"/>
+          </a:xfrm>
+          <a:prstGeom prst="rect">
+            <a:avLst/>
+          </a:prstGeom>
+          <a:gradFill rotWithShape="1">
+            <a:gsLst>
+              <a:gs pos="0">
+                <a:srgbClr val="4F81BD">
+                  <a:tint val="50000"/>
+                  <a:satMod val="300000"/>
+                </a:srgbClr>
+              </a:gs>
+              <a:gs pos="35000">
+                <a:srgbClr val="4F81BD">
+                  <a:tint val="37000"/>
+                  <a:satMod val="300000"/>
+                </a:srgbClr>
+              </a:gs>
+              <a:gs pos="100000">
+                <a:srgbClr val="4F81BD">
+                  <a:tint val="15000"/>
+                  <a:satMod val="350000"/>
+                </a:srgbClr>
+              </a:gs>
+            </a:gsLst>
+            <a:lin ang="16200000" scaled="1"/>
+          </a:gradFill>
+          <a:ln w="9525" cap="flat" cmpd="sng" algn="ctr">
+            <a:solidFill>
+              <a:srgbClr val="4F81BD">
+                <a:shade val="95000"/>
+                <a:satMod val="105000"/>
+              </a:srgbClr>
+            </a:solidFill>
+            <a:prstDash val="solid"/>
+          </a:ln>
+          <a:effectLst>
+            <a:outerShdw blurRad="40000" dist="20000" dir="5400000" rotWithShape="0">
+              <a:srgbClr val="000000">
+                <a:alpha val="38000"/>
+              </a:srgbClr>
+            </a:outerShdw>
+          </a:effectLst>
+        </p:spPr>
+        <p:txBody>
+          <a:bodyPr wrap="square" rtlCol="0" anchor="ctr">
+            <a:spAutoFit/>
+          </a:bodyPr>
+          <a:lstStyle/>
+          <a:p>
+            <a:pPr marL="0" marR="0" lvl="0" indent="0" algn="ctr" defTabSz="914400" eaLnBrk="1" fontAlgn="auto" latinLnBrk="0" hangingPunct="1">
+              <a:lnSpc>
+                <a:spcPct val="100000"/>
+              </a:lnSpc>
+              <a:spcBef>
+                <a:spcPts val="0"/>
+              </a:spcBef>
+              <a:spcAft>
+                <a:spcPts val="0"/>
+              </a:spcAft>
+              <a:buClrTx/>
+              <a:buSzTx/>
+              <a:buFontTx/>
+              <a:buNone/>
+              <a:tabLst/>
+              <a:defRPr/>
+            </a:pPr>
+            <a:r>
+              <a:rPr kumimoji="0" lang="en-US" sz="1800" b="0" i="0" u="none" strike="noStrike" kern="0" cap="none" spc="0" normalizeH="0" baseline="0" noProof="0" dirty="0" smtClean="0">
+                <a:ln>
+                  <a:noFill/>
+                </a:ln>
+                <a:solidFill>
+                  <a:sysClr val="windowText" lastClr="000000"/>
+                </a:solidFill>
+                <a:effectLst/>
+                <a:uLnTx/>
+                <a:uFillTx/>
+                <a:latin typeface="Calibri" pitchFamily="34" charset="0"/>
+              </a:rPr>
+              <a:t>Board</a:t>
+            </a:r>
+            <a:endParaRPr kumimoji="0" lang="en-US" sz="1800" b="0" i="0" u="none" strike="noStrike" kern="0" cap="none" spc="0" normalizeH="0" baseline="0" noProof="0" dirty="0">
+              <a:ln>
+                <a:noFill/>
+              </a:ln>
+              <a:solidFill>
+                <a:sysClr val="windowText" lastClr="000000"/>
+              </a:solidFill>
+              <a:effectLst/>
+              <a:uLnTx/>
+              <a:uFillTx/>
+              <a:latin typeface="Calibri" pitchFamily="34" charset="0"/>
+            </a:endParaRPr>
+          </a:p>
+        </p:txBody>
+      </p:sp>
+      <p:sp>
+        <p:nvSpPr>
+          <p:cNvPr id="6" name="Rectangle 5"/>
+          <p:cNvSpPr/>
+          <p:nvPr/>
+        </p:nvSpPr>
+        <p:spPr>
+          <a:xfrm>
+            <a:off x="2376501" y="2370618"/>
+            <a:ext cx="1143000" cy="369332"/>
+          </a:xfrm>
+          <a:prstGeom prst="rect">
+            <a:avLst/>
+          </a:prstGeom>
+          <a:gradFill rotWithShape="1">
+            <a:gsLst>
+              <a:gs pos="0">
+                <a:srgbClr val="4F81BD">
+                  <a:tint val="50000"/>
+                  <a:satMod val="300000"/>
+                </a:srgbClr>
+              </a:gs>
+              <a:gs pos="35000">
+                <a:srgbClr val="4F81BD">
+                  <a:tint val="37000"/>
+                  <a:satMod val="300000"/>
+                </a:srgbClr>
+              </a:gs>
+              <a:gs pos="100000">
+                <a:srgbClr val="4F81BD">
+                  <a:tint val="15000"/>
+                  <a:satMod val="350000"/>
+                </a:srgbClr>
+              </a:gs>
+            </a:gsLst>
+            <a:lin ang="16200000" scaled="1"/>
+          </a:gradFill>
+          <a:ln w="9525" cap="flat" cmpd="sng" algn="ctr">
+            <a:solidFill>
+              <a:srgbClr val="4F81BD">
+                <a:shade val="95000"/>
+                <a:satMod val="105000"/>
+              </a:srgbClr>
+            </a:solidFill>
+            <a:prstDash val="solid"/>
+          </a:ln>
+          <a:effectLst>
+            <a:outerShdw blurRad="40000" dist="20000" dir="5400000" rotWithShape="0">
+              <a:srgbClr val="000000">
+                <a:alpha val="38000"/>
+              </a:srgbClr>
+            </a:outerShdw>
+          </a:effectLst>
+        </p:spPr>
+        <p:txBody>
+          <a:bodyPr wrap="square" rtlCol="0" anchor="ctr">
+            <a:spAutoFit/>
+          </a:bodyPr>
+          <a:lstStyle/>
+          <a:p>
+            <a:pPr marL="0" marR="0" lvl="0" indent="0" algn="ctr" defTabSz="914400" eaLnBrk="1" fontAlgn="auto" latinLnBrk="0" hangingPunct="1">
+              <a:lnSpc>
+                <a:spcPct val="100000"/>
+              </a:lnSpc>
+              <a:spcBef>
+                <a:spcPts val="0"/>
+              </a:spcBef>
+              <a:spcAft>
+                <a:spcPts val="0"/>
+              </a:spcAft>
+              <a:buClrTx/>
+              <a:buSzTx/>
+              <a:buFontTx/>
+              <a:buNone/>
+              <a:tabLst/>
+              <a:defRPr/>
+            </a:pPr>
+            <a:r>
+              <a:rPr kumimoji="0" lang="en-US" sz="1800" b="0" i="0" u="none" strike="noStrike" kern="0" cap="none" spc="0" normalizeH="0" baseline="0" noProof="0" dirty="0" smtClean="0">
+                <a:ln>
+                  <a:noFill/>
+                </a:ln>
+                <a:solidFill>
+                  <a:sysClr val="windowText" lastClr="000000"/>
+                </a:solidFill>
+                <a:effectLst/>
+                <a:uLnTx/>
+                <a:uFillTx/>
+                <a:latin typeface="Calibri" pitchFamily="34" charset="0"/>
+              </a:rPr>
+              <a:t>Square</a:t>
+            </a:r>
+            <a:endParaRPr kumimoji="0" lang="en-US" sz="1800" b="0" i="0" u="none" strike="noStrike" kern="0" cap="none" spc="0" normalizeH="0" baseline="0" noProof="0" dirty="0">
+              <a:ln>
+                <a:noFill/>
+              </a:ln>
+              <a:solidFill>
+                <a:sysClr val="windowText" lastClr="000000"/>
+              </a:solidFill>
+              <a:effectLst/>
+              <a:uLnTx/>
+              <a:uFillTx/>
+              <a:latin typeface="Calibri" pitchFamily="34" charset="0"/>
+            </a:endParaRPr>
+          </a:p>
+        </p:txBody>
+      </p:sp>
+      <p:cxnSp>
+        <p:nvCxnSpPr>
+          <p:cNvPr id="7" name="Elbow Connector 43"/>
+          <p:cNvCxnSpPr>
+            <a:stCxn id="5" idx="3"/>
+            <a:endCxn id="6" idx="1"/>
+          </p:cNvCxnSpPr>
+          <p:nvPr/>
+        </p:nvCxnSpPr>
+        <p:spPr>
+          <a:xfrm flipV="1">
+            <a:off x="1250504" y="2555284"/>
+            <a:ext cx="1125997" cy="9620"/>
+          </a:xfrm>
+          <a:prstGeom prst="bentConnector3">
+            <a:avLst>
+              <a:gd name="adj1" fmla="val 50000"/>
+            </a:avLst>
+          </a:prstGeom>
+          <a:noFill/>
+          <a:ln w="19050" cap="flat" cmpd="sng" algn="ctr">
+            <a:solidFill>
+              <a:srgbClr val="FF0000"/>
+            </a:solidFill>
+            <a:prstDash val="solid"/>
+          </a:ln>
+          <a:effectLst/>
+        </p:spPr>
+      </p:cxnSp>
+      <p:sp>
+        <p:nvSpPr>
+          <p:cNvPr id="8" name="Rectangle 7"/>
+          <p:cNvSpPr/>
+          <p:nvPr/>
+        </p:nvSpPr>
+        <p:spPr>
+          <a:xfrm>
+            <a:off x="2376501" y="2719352"/>
+            <a:ext cx="1143000" cy="369332"/>
+          </a:xfrm>
+          <a:prstGeom prst="rect">
+            <a:avLst/>
+          </a:prstGeom>
+          <a:gradFill rotWithShape="1">
+            <a:gsLst>
+              <a:gs pos="0">
+                <a:srgbClr val="4F81BD">
+                  <a:tint val="50000"/>
+                  <a:satMod val="300000"/>
+                </a:srgbClr>
+              </a:gs>
+              <a:gs pos="35000">
+                <a:srgbClr val="4F81BD">
+                  <a:tint val="37000"/>
+                  <a:satMod val="300000"/>
+                </a:srgbClr>
+              </a:gs>
+              <a:gs pos="100000">
+                <a:srgbClr val="4F81BD">
+                  <a:tint val="15000"/>
+                  <a:satMod val="350000"/>
+                </a:srgbClr>
+              </a:gs>
+            </a:gsLst>
+            <a:lin ang="16200000" scaled="1"/>
+          </a:gradFill>
+          <a:ln w="9525" cap="flat" cmpd="sng" algn="ctr">
+            <a:solidFill>
+              <a:srgbClr val="4F81BD">
+                <a:shade val="95000"/>
+                <a:satMod val="105000"/>
+              </a:srgbClr>
+            </a:solidFill>
+            <a:prstDash val="solid"/>
+          </a:ln>
+          <a:effectLst>
+            <a:outerShdw blurRad="40000" dist="20000" dir="5400000" rotWithShape="0">
+              <a:srgbClr val="000000">
+                <a:alpha val="38000"/>
+              </a:srgbClr>
+            </a:outerShdw>
+          </a:effectLst>
+        </p:spPr>
+        <p:txBody>
+          <a:bodyPr wrap="square" rtlCol="0" anchor="ctr">
+            <a:spAutoFit/>
+          </a:bodyPr>
+          <a:lstStyle/>
+          <a:p>
+            <a:pPr marL="0" marR="0" lvl="0" indent="0" defTabSz="914400" eaLnBrk="1" fontAlgn="auto" latinLnBrk="0" hangingPunct="1">
+              <a:lnSpc>
+                <a:spcPct val="100000"/>
+              </a:lnSpc>
+              <a:spcBef>
+                <a:spcPts val="0"/>
+              </a:spcBef>
+              <a:spcAft>
+                <a:spcPts val="0"/>
+              </a:spcAft>
+              <a:buClrTx/>
+              <a:buSzTx/>
+              <a:buFontTx/>
+              <a:buNone/>
+              <a:tabLst/>
+              <a:defRPr/>
+            </a:pPr>
+            <a:r>
+              <a:rPr kumimoji="0" lang="en-US" sz="1800" b="0" i="0" u="none" strike="noStrike" kern="0" cap="none" spc="0" normalizeH="0" baseline="0" noProof="0" dirty="0" smtClean="0">
+                <a:ln>
+                  <a:noFill/>
+                </a:ln>
+                <a:solidFill>
+                  <a:sysClr val="windowText" lastClr="000000"/>
+                </a:solidFill>
+                <a:effectLst/>
+                <a:uLnTx/>
+                <a:uFillTx/>
+                <a:latin typeface="Calibri" pitchFamily="34" charset="0"/>
+              </a:rPr>
+              <a:t>number</a:t>
+            </a:r>
+            <a:endParaRPr kumimoji="0" lang="en-US" sz="1800" b="0" i="0" u="none" strike="noStrike" kern="0" cap="none" spc="0" normalizeH="0" baseline="0" noProof="0" dirty="0">
+              <a:ln>
+                <a:noFill/>
+              </a:ln>
+              <a:solidFill>
+                <a:sysClr val="windowText" lastClr="000000"/>
+              </a:solidFill>
+              <a:effectLst/>
+              <a:uLnTx/>
+              <a:uFillTx/>
+              <a:latin typeface="Calibri" pitchFamily="34" charset="0"/>
+            </a:endParaRPr>
+          </a:p>
+        </p:txBody>
+      </p:sp>
+      <p:sp>
+        <p:nvSpPr>
+          <p:cNvPr id="10" name="Rectangle 9"/>
+          <p:cNvSpPr/>
+          <p:nvPr/>
+        </p:nvSpPr>
+        <p:spPr>
+          <a:xfrm>
+            <a:off x="2376501" y="3012484"/>
+            <a:ext cx="1143000" cy="152400"/>
+          </a:xfrm>
+          <a:prstGeom prst="rect">
+            <a:avLst/>
+          </a:prstGeom>
+          <a:gradFill rotWithShape="1">
+            <a:gsLst>
+              <a:gs pos="0">
+                <a:srgbClr val="4F81BD">
+                  <a:tint val="50000"/>
+                  <a:satMod val="300000"/>
+                </a:srgbClr>
+              </a:gs>
+              <a:gs pos="35000">
+                <a:srgbClr val="4F81BD">
+                  <a:tint val="37000"/>
+                  <a:satMod val="300000"/>
+                </a:srgbClr>
+              </a:gs>
+              <a:gs pos="100000">
+                <a:srgbClr val="4F81BD">
+                  <a:tint val="15000"/>
+                  <a:satMod val="350000"/>
+                </a:srgbClr>
+              </a:gs>
+            </a:gsLst>
+            <a:lin ang="16200000" scaled="1"/>
+          </a:gradFill>
+          <a:ln w="9525" cap="flat" cmpd="sng" algn="ctr">
+            <a:solidFill>
+              <a:srgbClr val="4F81BD">
+                <a:shade val="95000"/>
+                <a:satMod val="105000"/>
+              </a:srgbClr>
+            </a:solidFill>
+            <a:prstDash val="solid"/>
+          </a:ln>
+          <a:effectLst>
+            <a:outerShdw blurRad="40000" dist="20000" dir="5400000" rotWithShape="0">
+              <a:srgbClr val="000000">
+                <a:alpha val="38000"/>
+              </a:srgbClr>
+            </a:outerShdw>
+          </a:effectLst>
+        </p:spPr>
+        <p:txBody>
+          <a:bodyPr wrap="square" rtlCol="0" anchor="ctr">
+            <a:noAutofit/>
+          </a:bodyPr>
+          <a:lstStyle/>
+          <a:p>
+            <a:pPr marL="0" marR="0" lvl="0" indent="0" defTabSz="914400" eaLnBrk="1" fontAlgn="auto" latinLnBrk="0" hangingPunct="1">
+              <a:lnSpc>
+                <a:spcPct val="100000"/>
+              </a:lnSpc>
+              <a:spcBef>
+                <a:spcPts val="0"/>
+              </a:spcBef>
+              <a:spcAft>
+                <a:spcPts val="0"/>
+              </a:spcAft>
+              <a:buClrTx/>
+              <a:buSzTx/>
+              <a:buFontTx/>
+              <a:buNone/>
+              <a:tabLst/>
+              <a:defRPr/>
+            </a:pPr>
+            <a:endParaRPr kumimoji="0" lang="en-US" sz="1800" b="0" i="0" u="none" strike="noStrike" kern="0" cap="none" spc="0" normalizeH="0" baseline="0" noProof="0" dirty="0">
+              <a:ln>
+                <a:noFill/>
+              </a:ln>
+              <a:solidFill>
+                <a:sysClr val="windowText" lastClr="000000"/>
+              </a:solidFill>
+              <a:effectLst/>
+              <a:uLnTx/>
+              <a:uFillTx/>
+              <a:latin typeface="Calibri" pitchFamily="34" charset="0"/>
+            </a:endParaRPr>
+          </a:p>
+        </p:txBody>
+      </p:sp>
+      <p:sp>
+        <p:nvSpPr>
+          <p:cNvPr id="12" name="TextBox 11"/>
+          <p:cNvSpPr txBox="1"/>
+          <p:nvPr/>
+        </p:nvSpPr>
+        <p:spPr>
+          <a:xfrm>
+            <a:off x="1419936" y="2588633"/>
+            <a:ext cx="952500" cy="369332"/>
+          </a:xfrm>
+          <a:prstGeom prst="rect">
+            <a:avLst/>
+          </a:prstGeom>
+          <a:noFill/>
+        </p:spPr>
+        <p:txBody>
+          <a:bodyPr wrap="square" rtlCol="0">
+            <a:spAutoFit/>
+          </a:bodyPr>
+          <a:lstStyle/>
+          <a:p>
+            <a:pPr marL="0" marR="0" lvl="0" indent="0" defTabSz="914400" eaLnBrk="1" fontAlgn="auto" latinLnBrk="0" hangingPunct="1">
+              <a:lnSpc>
+                <a:spcPct val="100000"/>
+              </a:lnSpc>
+              <a:spcBef>
+                <a:spcPts val="0"/>
+              </a:spcBef>
+              <a:spcAft>
+                <a:spcPts val="0"/>
+              </a:spcAft>
+              <a:buClrTx/>
+              <a:buSzTx/>
+              <a:buFontTx/>
+              <a:buNone/>
+              <a:tabLst/>
+              <a:defRPr/>
+            </a:pPr>
+            <a:r>
+              <a:rPr kumimoji="0" lang="en-US" sz="1800" b="0" i="0" u="none" strike="noStrike" kern="0" cap="none" spc="0" normalizeH="0" baseline="0" noProof="0" dirty="0" smtClean="0">
+                <a:ln>
+                  <a:noFill/>
+                </a:ln>
+                <a:solidFill>
+                  <a:sysClr val="windowText" lastClr="000000"/>
+                </a:solidFill>
+                <a:effectLst/>
+                <a:uLnTx/>
+                <a:uFillTx/>
+                <a:latin typeface="Calibri" pitchFamily="34" charset="0"/>
+              </a:rPr>
+              <a:t>     </a:t>
+            </a:r>
+            <a:endParaRPr kumimoji="0" lang="en-US" sz="1800" i="0" u="none" strike="noStrike" kern="0" cap="none" spc="0" normalizeH="0" baseline="0" noProof="0" dirty="0" smtClean="0">
+              <a:ln>
+                <a:noFill/>
+              </a:ln>
+              <a:solidFill>
+                <a:srgbClr val="7030A0"/>
+              </a:solidFill>
+              <a:effectLst/>
+              <a:uLnTx/>
+              <a:uFillTx/>
+              <a:latin typeface="Calibri" pitchFamily="34" charset="0"/>
+            </a:endParaRPr>
+          </a:p>
+        </p:txBody>
+      </p:sp>
+      <p:sp>
+        <p:nvSpPr>
+          <p:cNvPr id="13" name="Rectangle 12"/>
+          <p:cNvSpPr/>
+          <p:nvPr/>
+        </p:nvSpPr>
+        <p:spPr>
+          <a:xfrm>
+            <a:off x="1554552" y="2534686"/>
+            <a:ext cx="925253" cy="369332"/>
+          </a:xfrm>
+          <a:prstGeom prst="rect">
+            <a:avLst/>
+          </a:prstGeom>
+        </p:spPr>
+        <p:txBody>
+          <a:bodyPr wrap="none">
+            <a:spAutoFit/>
+          </a:bodyPr>
+          <a:lstStyle/>
+          <a:p>
+            <a:pPr lvl="0">
+              <a:defRPr/>
+            </a:pPr>
+            <a:r>
+              <a:rPr lang="en-US" kern="0" dirty="0">
+                <a:solidFill>
+                  <a:srgbClr val="FF0000"/>
+                </a:solidFill>
+                <a:latin typeface="Calibri" pitchFamily="34" charset="0"/>
+              </a:rPr>
+              <a:t>squares</a:t>
+            </a:r>
+          </a:p>
+        </p:txBody>
+      </p:sp>
+      <p:sp>
+        <p:nvSpPr>
+          <p:cNvPr id="14" name="Rectangle 13"/>
+          <p:cNvSpPr/>
+          <p:nvPr/>
+        </p:nvSpPr>
+        <p:spPr>
+          <a:xfrm>
+            <a:off x="1903682" y="2238815"/>
+            <a:ext cx="535724" cy="369332"/>
+          </a:xfrm>
+          <a:prstGeom prst="rect">
+            <a:avLst/>
+          </a:prstGeom>
+        </p:spPr>
+        <p:txBody>
+          <a:bodyPr wrap="none">
+            <a:spAutoFit/>
+          </a:bodyPr>
+          <a:lstStyle/>
+          <a:p>
+            <a:r>
+              <a:rPr lang="en-US" dirty="0">
+                <a:solidFill>
+                  <a:srgbClr val="FF0000"/>
+                </a:solidFill>
+              </a:rPr>
+              <a:t>100</a:t>
+            </a:r>
+            <a:endParaRPr lang="en-US" dirty="0">
+              <a:solidFill>
+                <a:srgbClr val="FF0000"/>
+              </a:solidFill>
+            </a:endParaRPr>
+          </a:p>
+        </p:txBody>
+      </p:sp>
+      <p:sp>
+        <p:nvSpPr>
+          <p:cNvPr id="18" name="Striped Right Arrow 17"/>
+          <p:cNvSpPr/>
+          <p:nvPr/>
+        </p:nvSpPr>
+        <p:spPr>
+          <a:xfrm>
+            <a:off x="3915173" y="2484245"/>
+            <a:ext cx="533400" cy="457200"/>
+          </a:xfrm>
+          <a:prstGeom prst="stripedRightArrow">
+            <a:avLst/>
+          </a:prstGeom>
+          <a:solidFill>
+            <a:schemeClr val="bg1">
+              <a:lumMod val="75000"/>
+            </a:schemeClr>
+          </a:solidFill>
+          <a:ln>
+            <a:solidFill>
+              <a:schemeClr val="bg1">
+                <a:lumMod val="85000"/>
+              </a:schemeClr>
+            </a:solidFill>
+          </a:ln>
+        </p:spPr>
+        <p:style>
+          <a:lnRef idx="1">
+            <a:schemeClr val="accent5"/>
+          </a:lnRef>
+          <a:fillRef idx="2">
+            <a:schemeClr val="accent5"/>
+          </a:fillRef>
+          <a:effectRef idx="1">
+            <a:schemeClr val="accent5"/>
+          </a:effectRef>
+          <a:fontRef idx="minor">
+            <a:schemeClr val="dk1"/>
+          </a:fontRef>
+        </p:style>
+        <p:txBody>
+          <a:bodyPr rtlCol="0" anchor="ctr"/>
+          <a:lstStyle/>
+          <a:p>
+            <a:pPr algn="ctr"/>
+            <a:endParaRPr lang="en-US"/>
+          </a:p>
+        </p:txBody>
+      </p:sp>
+      <p:sp>
+        <p:nvSpPr>
+          <p:cNvPr id="19" name="Rectangle 18"/>
+          <p:cNvSpPr/>
+          <p:nvPr/>
+        </p:nvSpPr>
+        <p:spPr>
+          <a:xfrm>
+            <a:off x="7800763" y="2302541"/>
+            <a:ext cx="1143000" cy="369332"/>
+          </a:xfrm>
+          <a:prstGeom prst="rect">
+            <a:avLst/>
+          </a:prstGeom>
+          <a:gradFill rotWithShape="1">
+            <a:gsLst>
+              <a:gs pos="0">
+                <a:srgbClr val="4F81BD">
+                  <a:tint val="50000"/>
+                  <a:satMod val="300000"/>
+                </a:srgbClr>
+              </a:gs>
+              <a:gs pos="35000">
+                <a:srgbClr val="4F81BD">
+                  <a:tint val="37000"/>
+                  <a:satMod val="300000"/>
+                </a:srgbClr>
+              </a:gs>
+              <a:gs pos="100000">
+                <a:srgbClr val="4F81BD">
+                  <a:tint val="15000"/>
+                  <a:satMod val="350000"/>
+                </a:srgbClr>
+              </a:gs>
+            </a:gsLst>
+            <a:lin ang="16200000" scaled="1"/>
+          </a:gradFill>
+          <a:ln w="9525" cap="flat" cmpd="sng" algn="ctr">
+            <a:solidFill>
+              <a:srgbClr val="4F81BD">
+                <a:shade val="95000"/>
+                <a:satMod val="105000"/>
+              </a:srgbClr>
+            </a:solidFill>
+            <a:prstDash val="solid"/>
+          </a:ln>
+          <a:effectLst>
+            <a:outerShdw blurRad="40000" dist="20000" dir="5400000" rotWithShape="0">
+              <a:srgbClr val="000000">
+                <a:alpha val="38000"/>
+              </a:srgbClr>
+            </a:outerShdw>
+          </a:effectLst>
+        </p:spPr>
+        <p:txBody>
+          <a:bodyPr wrap="square" rtlCol="0" anchor="ctr">
+            <a:spAutoFit/>
+          </a:bodyPr>
+          <a:lstStyle/>
+          <a:p>
+            <a:pPr marL="0" marR="0" lvl="0" indent="0" algn="ctr" defTabSz="914400" eaLnBrk="1" fontAlgn="auto" latinLnBrk="0" hangingPunct="1">
+              <a:lnSpc>
+                <a:spcPct val="100000"/>
+              </a:lnSpc>
+              <a:spcBef>
+                <a:spcPts val="0"/>
+              </a:spcBef>
+              <a:spcAft>
+                <a:spcPts val="0"/>
+              </a:spcAft>
+              <a:buClrTx/>
+              <a:buSzTx/>
+              <a:buFontTx/>
+              <a:buNone/>
+              <a:tabLst/>
+              <a:defRPr/>
+            </a:pPr>
+            <a:r>
+              <a:rPr kumimoji="0" lang="en-US" sz="1800" b="0" i="0" u="none" strike="noStrike" kern="0" cap="none" spc="0" normalizeH="0" baseline="0" noProof="0" dirty="0" smtClean="0">
+                <a:ln>
+                  <a:noFill/>
+                </a:ln>
+                <a:solidFill>
+                  <a:sysClr val="windowText" lastClr="000000"/>
+                </a:solidFill>
+                <a:effectLst/>
+                <a:uLnTx/>
+                <a:uFillTx/>
+                <a:latin typeface="Calibri" pitchFamily="34" charset="0"/>
+              </a:rPr>
+              <a:t>Square</a:t>
+            </a:r>
+            <a:endParaRPr kumimoji="0" lang="en-US" sz="1800" b="0" i="0" u="none" strike="noStrike" kern="0" cap="none" spc="0" normalizeH="0" baseline="0" noProof="0" dirty="0">
+              <a:ln>
+                <a:noFill/>
+              </a:ln>
+              <a:solidFill>
+                <a:sysClr val="windowText" lastClr="000000"/>
+              </a:solidFill>
+              <a:effectLst/>
+              <a:uLnTx/>
+              <a:uFillTx/>
+              <a:latin typeface="Calibri" pitchFamily="34" charset="0"/>
+            </a:endParaRPr>
+          </a:p>
+        </p:txBody>
+      </p:sp>
+      <p:sp>
+        <p:nvSpPr>
+          <p:cNvPr id="20" name="Rectangle 19"/>
+          <p:cNvSpPr/>
+          <p:nvPr/>
+        </p:nvSpPr>
+        <p:spPr>
+          <a:xfrm>
+            <a:off x="7800763" y="2651275"/>
+            <a:ext cx="1143000" cy="369332"/>
+          </a:xfrm>
+          <a:prstGeom prst="rect">
+            <a:avLst/>
+          </a:prstGeom>
+          <a:gradFill rotWithShape="1">
+            <a:gsLst>
+              <a:gs pos="0">
+                <a:srgbClr val="4F81BD">
+                  <a:tint val="50000"/>
+                  <a:satMod val="300000"/>
+                </a:srgbClr>
+              </a:gs>
+              <a:gs pos="35000">
+                <a:srgbClr val="4F81BD">
+                  <a:tint val="37000"/>
+                  <a:satMod val="300000"/>
+                </a:srgbClr>
+              </a:gs>
+              <a:gs pos="100000">
+                <a:srgbClr val="4F81BD">
+                  <a:tint val="15000"/>
+                  <a:satMod val="350000"/>
+                </a:srgbClr>
+              </a:gs>
+            </a:gsLst>
+            <a:lin ang="16200000" scaled="1"/>
+          </a:gradFill>
+          <a:ln w="9525" cap="flat" cmpd="sng" algn="ctr">
+            <a:solidFill>
+              <a:srgbClr val="4F81BD">
+                <a:shade val="95000"/>
+                <a:satMod val="105000"/>
+              </a:srgbClr>
+            </a:solidFill>
+            <a:prstDash val="solid"/>
+          </a:ln>
+          <a:effectLst>
+            <a:outerShdw blurRad="40000" dist="20000" dir="5400000" rotWithShape="0">
+              <a:srgbClr val="000000">
+                <a:alpha val="38000"/>
+              </a:srgbClr>
+            </a:outerShdw>
+          </a:effectLst>
+        </p:spPr>
+        <p:txBody>
+          <a:bodyPr wrap="square" rtlCol="0" anchor="ctr">
+            <a:spAutoFit/>
+          </a:bodyPr>
+          <a:lstStyle/>
+          <a:p>
+            <a:pPr marL="0" marR="0" lvl="0" indent="0" defTabSz="914400" eaLnBrk="1" fontAlgn="auto" latinLnBrk="0" hangingPunct="1">
+              <a:lnSpc>
+                <a:spcPct val="100000"/>
+              </a:lnSpc>
+              <a:spcBef>
+                <a:spcPts val="0"/>
+              </a:spcBef>
+              <a:spcAft>
+                <a:spcPts val="0"/>
+              </a:spcAft>
+              <a:buClrTx/>
+              <a:buSzTx/>
+              <a:buFontTx/>
+              <a:buNone/>
+              <a:tabLst/>
+              <a:defRPr/>
+            </a:pPr>
+            <a:r>
+              <a:rPr kumimoji="0" lang="en-US" sz="1800" b="0" i="0" u="none" strike="noStrike" kern="0" cap="none" spc="0" normalizeH="0" baseline="0" noProof="0" dirty="0" smtClean="0">
+                <a:ln>
+                  <a:noFill/>
+                </a:ln>
+                <a:solidFill>
+                  <a:sysClr val="windowText" lastClr="000000"/>
+                </a:solidFill>
+                <a:effectLst/>
+                <a:uLnTx/>
+                <a:uFillTx/>
+                <a:latin typeface="Calibri" pitchFamily="34" charset="0"/>
+              </a:rPr>
+              <a:t>number</a:t>
+            </a:r>
+            <a:endParaRPr kumimoji="0" lang="en-US" sz="1800" b="0" i="0" u="none" strike="noStrike" kern="0" cap="none" spc="0" normalizeH="0" baseline="0" noProof="0" dirty="0">
+              <a:ln>
+                <a:noFill/>
+              </a:ln>
+              <a:solidFill>
+                <a:sysClr val="windowText" lastClr="000000"/>
+              </a:solidFill>
+              <a:effectLst/>
+              <a:uLnTx/>
+              <a:uFillTx/>
+              <a:latin typeface="Calibri" pitchFamily="34" charset="0"/>
+            </a:endParaRPr>
+          </a:p>
+        </p:txBody>
+      </p:sp>
+      <p:sp>
+        <p:nvSpPr>
+          <p:cNvPr id="21" name="Rectangle 20"/>
+          <p:cNvSpPr/>
+          <p:nvPr/>
+        </p:nvSpPr>
+        <p:spPr>
+          <a:xfrm>
+            <a:off x="7800763" y="2944407"/>
+            <a:ext cx="1143000" cy="152400"/>
+          </a:xfrm>
+          <a:prstGeom prst="rect">
+            <a:avLst/>
+          </a:prstGeom>
+          <a:gradFill rotWithShape="1">
+            <a:gsLst>
+              <a:gs pos="0">
+                <a:srgbClr val="4F81BD">
+                  <a:tint val="50000"/>
+                  <a:satMod val="300000"/>
+                </a:srgbClr>
+              </a:gs>
+              <a:gs pos="35000">
+                <a:srgbClr val="4F81BD">
+                  <a:tint val="37000"/>
+                  <a:satMod val="300000"/>
+                </a:srgbClr>
+              </a:gs>
+              <a:gs pos="100000">
+                <a:srgbClr val="4F81BD">
+                  <a:tint val="15000"/>
+                  <a:satMod val="350000"/>
+                </a:srgbClr>
+              </a:gs>
+            </a:gsLst>
+            <a:lin ang="16200000" scaled="1"/>
+          </a:gradFill>
+          <a:ln w="9525" cap="flat" cmpd="sng" algn="ctr">
+            <a:solidFill>
+              <a:srgbClr val="4F81BD">
+                <a:shade val="95000"/>
+                <a:satMod val="105000"/>
+              </a:srgbClr>
+            </a:solidFill>
+            <a:prstDash val="solid"/>
+          </a:ln>
+          <a:effectLst>
+            <a:outerShdw blurRad="40000" dist="20000" dir="5400000" rotWithShape="0">
+              <a:srgbClr val="000000">
+                <a:alpha val="38000"/>
+              </a:srgbClr>
+            </a:outerShdw>
+          </a:effectLst>
+        </p:spPr>
+        <p:txBody>
+          <a:bodyPr wrap="square" rtlCol="0" anchor="ctr">
+            <a:noAutofit/>
+          </a:bodyPr>
+          <a:lstStyle/>
+          <a:p>
+            <a:pPr marL="0" marR="0" lvl="0" indent="0" defTabSz="914400" eaLnBrk="1" fontAlgn="auto" latinLnBrk="0" hangingPunct="1">
+              <a:lnSpc>
+                <a:spcPct val="100000"/>
+              </a:lnSpc>
+              <a:spcBef>
+                <a:spcPts val="0"/>
+              </a:spcBef>
+              <a:spcAft>
+                <a:spcPts val="0"/>
+              </a:spcAft>
+              <a:buClrTx/>
+              <a:buSzTx/>
+              <a:buFontTx/>
+              <a:buNone/>
+              <a:tabLst/>
+              <a:defRPr/>
+            </a:pPr>
+            <a:endParaRPr kumimoji="0" lang="en-US" sz="1800" b="0" i="0" u="none" strike="noStrike" kern="0" cap="none" spc="0" normalizeH="0" baseline="0" noProof="0" dirty="0">
+              <a:ln>
+                <a:noFill/>
+              </a:ln>
+              <a:solidFill>
+                <a:sysClr val="windowText" lastClr="000000"/>
+              </a:solidFill>
               <a:effectLst/>
               <a:uLnTx/>
               <a:uFillTx/>

</xml_diff>